<commit_message>
lexical analyzer modified, syntax analyzer done with partial test
</commit_message>
<xml_diff>
--- a/regular expression/mergedNFA.pptx
+++ b/regular expression/mergedNFA.pptx
@@ -244,7 +244,7 @@
           <a:p>
             <a:fld id="{49053632-6288-D34A-AFF3-8C720C1D466D}" type="datetimeFigureOut">
               <a:rPr lang="en-KR" smtClean="0"/>
-              <a:t>2023/08/06</a:t>
+              <a:t>2023/08/12</a:t>
             </a:fld>
             <a:endParaRPr lang="en-KR"/>
           </a:p>
@@ -414,7 +414,7 @@
           <a:p>
             <a:fld id="{49053632-6288-D34A-AFF3-8C720C1D466D}" type="datetimeFigureOut">
               <a:rPr lang="en-KR" smtClean="0"/>
-              <a:t>2023/08/06</a:t>
+              <a:t>2023/08/12</a:t>
             </a:fld>
             <a:endParaRPr lang="en-KR"/>
           </a:p>
@@ -594,7 +594,7 @@
           <a:p>
             <a:fld id="{49053632-6288-D34A-AFF3-8C720C1D466D}" type="datetimeFigureOut">
               <a:rPr lang="en-KR" smtClean="0"/>
-              <a:t>2023/08/06</a:t>
+              <a:t>2023/08/12</a:t>
             </a:fld>
             <a:endParaRPr lang="en-KR"/>
           </a:p>
@@ -764,7 +764,7 @@
           <a:p>
             <a:fld id="{49053632-6288-D34A-AFF3-8C720C1D466D}" type="datetimeFigureOut">
               <a:rPr lang="en-KR" smtClean="0"/>
-              <a:t>2023/08/06</a:t>
+              <a:t>2023/08/12</a:t>
             </a:fld>
             <a:endParaRPr lang="en-KR"/>
           </a:p>
@@ -1008,7 +1008,7 @@
           <a:p>
             <a:fld id="{49053632-6288-D34A-AFF3-8C720C1D466D}" type="datetimeFigureOut">
               <a:rPr lang="en-KR" smtClean="0"/>
-              <a:t>2023/08/06</a:t>
+              <a:t>2023/08/12</a:t>
             </a:fld>
             <a:endParaRPr lang="en-KR"/>
           </a:p>
@@ -1240,7 +1240,7 @@
           <a:p>
             <a:fld id="{49053632-6288-D34A-AFF3-8C720C1D466D}" type="datetimeFigureOut">
               <a:rPr lang="en-KR" smtClean="0"/>
-              <a:t>2023/08/06</a:t>
+              <a:t>2023/08/12</a:t>
             </a:fld>
             <a:endParaRPr lang="en-KR"/>
           </a:p>
@@ -1607,7 +1607,7 @@
           <a:p>
             <a:fld id="{49053632-6288-D34A-AFF3-8C720C1D466D}" type="datetimeFigureOut">
               <a:rPr lang="en-KR" smtClean="0"/>
-              <a:t>2023/08/06</a:t>
+              <a:t>2023/08/12</a:t>
             </a:fld>
             <a:endParaRPr lang="en-KR"/>
           </a:p>
@@ -1725,7 +1725,7 @@
           <a:p>
             <a:fld id="{49053632-6288-D34A-AFF3-8C720C1D466D}" type="datetimeFigureOut">
               <a:rPr lang="en-KR" smtClean="0"/>
-              <a:t>2023/08/06</a:t>
+              <a:t>2023/08/12</a:t>
             </a:fld>
             <a:endParaRPr lang="en-KR"/>
           </a:p>
@@ -1820,7 +1820,7 @@
           <a:p>
             <a:fld id="{49053632-6288-D34A-AFF3-8C720C1D466D}" type="datetimeFigureOut">
               <a:rPr lang="en-KR" smtClean="0"/>
-              <a:t>2023/08/06</a:t>
+              <a:t>2023/08/12</a:t>
             </a:fld>
             <a:endParaRPr lang="en-KR"/>
           </a:p>
@@ -2097,7 +2097,7 @@
           <a:p>
             <a:fld id="{49053632-6288-D34A-AFF3-8C720C1D466D}" type="datetimeFigureOut">
               <a:rPr lang="en-KR" smtClean="0"/>
-              <a:t>2023/08/06</a:t>
+              <a:t>2023/08/12</a:t>
             </a:fld>
             <a:endParaRPr lang="en-KR"/>
           </a:p>
@@ -2354,7 +2354,7 @@
           <a:p>
             <a:fld id="{49053632-6288-D34A-AFF3-8C720C1D466D}" type="datetimeFigureOut">
               <a:rPr lang="en-KR" smtClean="0"/>
-              <a:t>2023/08/06</a:t>
+              <a:t>2023/08/12</a:t>
             </a:fld>
             <a:endParaRPr lang="en-KR"/>
           </a:p>
@@ -2567,7 +2567,7 @@
           <a:p>
             <a:fld id="{49053632-6288-D34A-AFF3-8C720C1D466D}" type="datetimeFigureOut">
               <a:rPr lang="en-KR" smtClean="0"/>
-              <a:t>2023/08/06</a:t>
+              <a:t>2023/08/12</a:t>
             </a:fld>
             <a:endParaRPr lang="en-KR"/>
           </a:p>
@@ -2986,7 +2986,7 @@
         </p:nvSpPr>
         <p:spPr>
           <a:xfrm>
-            <a:off x="10317404" y="1789564"/>
+            <a:off x="10554705" y="844924"/>
             <a:ext cx="586500" cy="558224"/>
           </a:xfrm>
           <a:prstGeom prst="ellipse">
@@ -3026,7 +3026,7 @@
                   <a:schemeClr val="tx1"/>
                 </a:solidFill>
               </a:rPr>
-              <a:t>7</a:t>
+              <a:t>8</a:t>
             </a:r>
             <a:endParaRPr lang="en-KR" dirty="0">
               <a:solidFill>
@@ -3090,7 +3090,7 @@
                   <a:schemeClr val="tx1"/>
                 </a:solidFill>
               </a:rPr>
-              <a:t>8</a:t>
+              <a:t>10</a:t>
             </a:r>
             <a:endParaRPr lang="en-KR" dirty="0">
               <a:solidFill>
@@ -3359,7 +3359,7 @@
                   <a:schemeClr val="tx1"/>
                 </a:solidFill>
               </a:rPr>
-              <a:t>9</a:t>
+              <a:t>11</a:t>
             </a:r>
             <a:endParaRPr lang="en-KR" dirty="0">
               <a:solidFill>
@@ -3423,7 +3423,7 @@
                   <a:schemeClr val="tx1"/>
                 </a:solidFill>
               </a:rPr>
-              <a:t>10</a:t>
+              <a:t>12</a:t>
             </a:r>
             <a:endParaRPr lang="en-KR" dirty="0">
               <a:solidFill>
@@ -3487,7 +3487,7 @@
                   <a:schemeClr val="tx1"/>
                 </a:solidFill>
               </a:rPr>
-              <a:t>11</a:t>
+              <a:t>13</a:t>
             </a:r>
             <a:endParaRPr lang="en-KR" dirty="0">
               <a:solidFill>
@@ -3627,8 +3627,8 @@
         </p:nvCxnSpPr>
         <p:spPr>
           <a:xfrm flipV="1">
-            <a:off x="10903904" y="279112"/>
-            <a:ext cx="1336544" cy="1789564"/>
+            <a:off x="11141205" y="279112"/>
+            <a:ext cx="1099243" cy="844924"/>
           </a:xfrm>
           <a:prstGeom prst="straightConnector1">
             <a:avLst/>
@@ -3672,9 +3672,9 @@
           <p:nvPr/>
         </p:nvCxnSpPr>
         <p:spPr>
-          <a:xfrm flipV="1">
-            <a:off x="10903904" y="1453006"/>
-            <a:ext cx="1336544" cy="615670"/>
+          <a:xfrm>
+            <a:off x="11141205" y="1124036"/>
+            <a:ext cx="1099243" cy="328970"/>
           </a:xfrm>
           <a:prstGeom prst="straightConnector1">
             <a:avLst/>
@@ -3712,15 +3712,15 @@
           </p:cNvPr>
           <p:cNvCxnSpPr>
             <a:cxnSpLocks/>
-            <a:stCxn id="46" idx="6"/>
+            <a:stCxn id="466" idx="5"/>
             <a:endCxn id="50" idx="2"/>
           </p:cNvCxnSpPr>
           <p:nvPr/>
         </p:nvCxnSpPr>
         <p:spPr>
-          <a:xfrm>
-            <a:off x="10903904" y="2068676"/>
-            <a:ext cx="1336544" cy="505145"/>
+          <a:xfrm flipV="1">
+            <a:off x="11055314" y="2573821"/>
+            <a:ext cx="1185134" cy="399396"/>
           </a:xfrm>
           <a:prstGeom prst="straightConnector1">
             <a:avLst/>
@@ -3758,15 +3758,15 @@
           </p:cNvPr>
           <p:cNvCxnSpPr>
             <a:cxnSpLocks/>
-            <a:stCxn id="46" idx="6"/>
+            <a:stCxn id="466" idx="5"/>
             <a:endCxn id="51" idx="2"/>
           </p:cNvCxnSpPr>
           <p:nvPr/>
         </p:nvCxnSpPr>
         <p:spPr>
           <a:xfrm>
-            <a:off x="10903904" y="2068676"/>
-            <a:ext cx="1336544" cy="1653375"/>
+            <a:off x="11055314" y="2973217"/>
+            <a:ext cx="1185134" cy="748834"/>
           </a:xfrm>
           <a:prstGeom prst="straightConnector1">
             <a:avLst/>
@@ -4014,7 +4014,7 @@
         </p:nvSpPr>
         <p:spPr>
           <a:xfrm>
-            <a:off x="11566720" y="2017590"/>
+            <a:off x="11566720" y="2421634"/>
             <a:ext cx="1067551" cy="558224"/>
           </a:xfrm>
           <a:prstGeom prst="rect">
@@ -4219,7 +4219,7 @@
         </p:nvSpPr>
         <p:spPr>
           <a:xfrm>
-            <a:off x="11650482" y="2757486"/>
+            <a:off x="11650482" y="3698642"/>
             <a:ext cx="1067551" cy="558224"/>
           </a:xfrm>
           <a:prstGeom prst="rect">
@@ -4534,7 +4534,7 @@
         </p:nvSpPr>
         <p:spPr>
           <a:xfrm>
-            <a:off x="10316035" y="5812924"/>
+            <a:off x="11135339" y="7988321"/>
             <a:ext cx="586500" cy="558224"/>
           </a:xfrm>
           <a:prstGeom prst="ellipse">
@@ -4574,7 +4574,7 @@
                   <a:schemeClr val="tx1"/>
                 </a:solidFill>
               </a:rPr>
-              <a:t>12</a:t>
+              <a:t>15</a:t>
             </a:r>
             <a:endParaRPr lang="en-KR" dirty="0">
               <a:solidFill>
@@ -4598,7 +4598,7 @@
         </p:nvSpPr>
         <p:spPr>
           <a:xfrm>
-            <a:off x="12398428" y="5239720"/>
+            <a:off x="13217732" y="7415117"/>
             <a:ext cx="586500" cy="558224"/>
           </a:xfrm>
           <a:prstGeom prst="ellipse">
@@ -4638,7 +4638,7 @@
                   <a:schemeClr val="tx1"/>
                 </a:solidFill>
               </a:rPr>
-              <a:t>13</a:t>
+              <a:t>16</a:t>
             </a:r>
             <a:endParaRPr lang="en-KR" dirty="0">
               <a:solidFill>
@@ -4662,7 +4662,7 @@
         </p:nvSpPr>
         <p:spPr>
           <a:xfrm>
-            <a:off x="12387248" y="6416355"/>
+            <a:off x="13206552" y="8591752"/>
             <a:ext cx="586500" cy="558224"/>
           </a:xfrm>
           <a:prstGeom prst="ellipse">
@@ -4702,7 +4702,7 @@
                   <a:schemeClr val="tx1"/>
                 </a:solidFill>
               </a:rPr>
-              <a:t>14</a:t>
+              <a:t>17</a:t>
             </a:r>
             <a:endParaRPr lang="en-KR" dirty="0">
               <a:solidFill>
@@ -4726,7 +4726,7 @@
         </p:nvSpPr>
         <p:spPr>
           <a:xfrm>
-            <a:off x="12387248" y="7564585"/>
+            <a:off x="13206552" y="9739982"/>
             <a:ext cx="586500" cy="558224"/>
           </a:xfrm>
           <a:prstGeom prst="ellipse">
@@ -4766,7 +4766,7 @@
                   <a:schemeClr val="tx1"/>
                 </a:solidFill>
               </a:rPr>
-              <a:t>15</a:t>
+              <a:t>18</a:t>
             </a:r>
             <a:endParaRPr lang="en-KR" dirty="0">
               <a:solidFill>
@@ -4790,7 +4790,7 @@
         </p:nvSpPr>
         <p:spPr>
           <a:xfrm>
-            <a:off x="12459984" y="6488852"/>
+            <a:off x="13279288" y="8664249"/>
             <a:ext cx="436182" cy="415153"/>
           </a:xfrm>
           <a:prstGeom prst="ellipse">
@@ -4846,7 +4846,7 @@
         </p:nvSpPr>
         <p:spPr>
           <a:xfrm>
-            <a:off x="12459984" y="7638030"/>
+            <a:off x="13279288" y="9813427"/>
             <a:ext cx="436182" cy="415153"/>
           </a:xfrm>
           <a:prstGeom prst="ellipse">
@@ -4906,7 +4906,7 @@
         </p:nvCxnSpPr>
         <p:spPr>
           <a:xfrm flipV="1">
-            <a:off x="10902535" y="5518832"/>
+            <a:off x="11721839" y="7694229"/>
             <a:ext cx="1495893" cy="573204"/>
           </a:xfrm>
           <a:prstGeom prst="straightConnector1">
@@ -4951,7 +4951,7 @@
         </p:nvCxnSpPr>
         <p:spPr>
           <a:xfrm>
-            <a:off x="10902535" y="6092036"/>
+            <a:off x="11721839" y="8267433"/>
             <a:ext cx="1523238" cy="551388"/>
           </a:xfrm>
           <a:prstGeom prst="straightConnector1">
@@ -4995,7 +4995,7 @@
         </p:nvSpPr>
         <p:spPr>
           <a:xfrm>
-            <a:off x="11581181" y="6083312"/>
+            <a:off x="12400485" y="8258709"/>
             <a:ext cx="1067551" cy="558224"/>
           </a:xfrm>
           <a:prstGeom prst="rect">
@@ -5198,7 +5198,7 @@
         </p:nvSpPr>
         <p:spPr>
           <a:xfrm>
-            <a:off x="12471164" y="5308985"/>
+            <a:off x="13290468" y="7484382"/>
             <a:ext cx="436182" cy="415153"/>
           </a:xfrm>
           <a:prstGeom prst="ellipse">
@@ -5254,7 +5254,7 @@
         </p:nvSpPr>
         <p:spPr>
           <a:xfrm>
-            <a:off x="10073807" y="10699726"/>
+            <a:off x="10073807" y="13136248"/>
             <a:ext cx="586500" cy="558224"/>
           </a:xfrm>
           <a:prstGeom prst="ellipse">
@@ -5294,7 +5294,7 @@
                   <a:schemeClr val="tx1"/>
                 </a:solidFill>
               </a:rPr>
-              <a:t>17</a:t>
+              <a:t>20</a:t>
             </a:r>
             <a:endParaRPr lang="en-KR" dirty="0">
               <a:solidFill>
@@ -5318,7 +5318,7 @@
         </p:nvSpPr>
         <p:spPr>
           <a:xfrm>
-            <a:off x="11996851" y="8910162"/>
+            <a:off x="11996851" y="11346684"/>
             <a:ext cx="586500" cy="558224"/>
           </a:xfrm>
           <a:prstGeom prst="ellipse">
@@ -5358,7 +5358,7 @@
                   <a:schemeClr val="tx1"/>
                 </a:solidFill>
               </a:rPr>
-              <a:t>18</a:t>
+              <a:t>21</a:t>
             </a:r>
             <a:endParaRPr lang="en-KR" dirty="0">
               <a:solidFill>
@@ -5384,7 +5384,7 @@
         </p:nvSpPr>
         <p:spPr>
           <a:xfrm>
-            <a:off x="11002036" y="9755086"/>
+            <a:off x="11002036" y="12191608"/>
             <a:ext cx="1067551" cy="558224"/>
           </a:xfrm>
           <a:prstGeom prst="rect">
@@ -5584,7 +5584,7 @@
         </p:nvSpPr>
         <p:spPr>
           <a:xfrm>
-            <a:off x="11996851" y="10084056"/>
+            <a:off x="11996851" y="12520578"/>
             <a:ext cx="586500" cy="558224"/>
           </a:xfrm>
           <a:prstGeom prst="ellipse">
@@ -5624,7 +5624,7 @@
                   <a:schemeClr val="tx1"/>
                 </a:solidFill>
               </a:rPr>
-              <a:t>20</a:t>
+              <a:t>22</a:t>
             </a:r>
             <a:endParaRPr lang="en-KR" dirty="0">
               <a:solidFill>
@@ -5648,7 +5648,7 @@
         </p:nvSpPr>
         <p:spPr>
           <a:xfrm>
-            <a:off x="11996851" y="11204871"/>
+            <a:off x="11996851" y="13641393"/>
             <a:ext cx="586500" cy="558224"/>
           </a:xfrm>
           <a:prstGeom prst="ellipse">
@@ -5688,7 +5688,7 @@
                   <a:schemeClr val="tx1"/>
                 </a:solidFill>
               </a:rPr>
-              <a:t>22</a:t>
+              <a:t>23</a:t>
             </a:r>
             <a:endParaRPr lang="en-KR" dirty="0">
               <a:solidFill>
@@ -5712,7 +5712,7 @@
         </p:nvSpPr>
         <p:spPr>
           <a:xfrm>
-            <a:off x="11996851" y="12353101"/>
+            <a:off x="11996851" y="14789623"/>
             <a:ext cx="586500" cy="558224"/>
           </a:xfrm>
           <a:prstGeom prst="ellipse">
@@ -5776,7 +5776,7 @@
         </p:nvSpPr>
         <p:spPr>
           <a:xfrm>
-            <a:off x="13307821" y="8910162"/>
+            <a:off x="13307821" y="11346684"/>
             <a:ext cx="586500" cy="558224"/>
           </a:xfrm>
           <a:prstGeom prst="ellipse">
@@ -5816,7 +5816,7 @@
                   <a:schemeClr val="tx1"/>
                 </a:solidFill>
               </a:rPr>
-              <a:t>19</a:t>
+              <a:t>25</a:t>
             </a:r>
             <a:endParaRPr lang="en-KR" dirty="0">
               <a:solidFill>
@@ -5840,7 +5840,7 @@
         </p:nvSpPr>
         <p:spPr>
           <a:xfrm>
-            <a:off x="13307821" y="10087581"/>
+            <a:off x="13307821" y="12524103"/>
             <a:ext cx="586500" cy="558224"/>
           </a:xfrm>
           <a:prstGeom prst="ellipse">
@@ -5880,7 +5880,7 @@
                   <a:schemeClr val="tx1"/>
                 </a:solidFill>
               </a:rPr>
-              <a:t>21</a:t>
+              <a:t>26</a:t>
             </a:r>
             <a:endParaRPr lang="en-KR" dirty="0">
               <a:solidFill>
@@ -5904,7 +5904,7 @@
         </p:nvSpPr>
         <p:spPr>
           <a:xfrm>
-            <a:off x="13290866" y="11204871"/>
+            <a:off x="13290866" y="13641393"/>
             <a:ext cx="586500" cy="558224"/>
           </a:xfrm>
           <a:prstGeom prst="ellipse">
@@ -5944,7 +5944,7 @@
                   <a:schemeClr val="tx1"/>
                 </a:solidFill>
               </a:rPr>
-              <a:t>23</a:t>
+              <a:t>27</a:t>
             </a:r>
             <a:endParaRPr lang="en-KR" dirty="0">
               <a:solidFill>
@@ -5968,7 +5968,7 @@
         </p:nvSpPr>
         <p:spPr>
           <a:xfrm>
-            <a:off x="13260969" y="12347066"/>
+            <a:off x="13260969" y="14783588"/>
             <a:ext cx="586500" cy="558224"/>
           </a:xfrm>
           <a:prstGeom prst="ellipse">
@@ -6008,7 +6008,7 @@
                   <a:schemeClr val="tx1"/>
                 </a:solidFill>
               </a:rPr>
-              <a:t>25</a:t>
+              <a:t>28</a:t>
             </a:r>
             <a:endParaRPr lang="en-KR" dirty="0">
               <a:solidFill>
@@ -6032,7 +6032,7 @@
         </p:nvSpPr>
         <p:spPr>
           <a:xfrm>
-            <a:off x="12069587" y="11277368"/>
+            <a:off x="12069587" y="13713890"/>
             <a:ext cx="436182" cy="415153"/>
           </a:xfrm>
           <a:prstGeom prst="ellipse">
@@ -6088,7 +6088,7 @@
         </p:nvSpPr>
         <p:spPr>
           <a:xfrm>
-            <a:off x="12069587" y="12426546"/>
+            <a:off x="12069587" y="14863068"/>
             <a:ext cx="436182" cy="415153"/>
           </a:xfrm>
           <a:prstGeom prst="ellipse">
@@ -6148,7 +6148,7 @@
         </p:nvCxnSpPr>
         <p:spPr>
           <a:xfrm flipV="1">
-            <a:off x="10660307" y="9189274"/>
+            <a:off x="10660307" y="11625796"/>
             <a:ext cx="1336544" cy="1789564"/>
           </a:xfrm>
           <a:prstGeom prst="straightConnector1">
@@ -6194,7 +6194,7 @@
         </p:nvCxnSpPr>
         <p:spPr>
           <a:xfrm flipV="1">
-            <a:off x="10660307" y="10363168"/>
+            <a:off x="10660307" y="12799690"/>
             <a:ext cx="1336544" cy="615670"/>
           </a:xfrm>
           <a:prstGeom prst="straightConnector1">
@@ -6240,7 +6240,7 @@
         </p:nvCxnSpPr>
         <p:spPr>
           <a:xfrm>
-            <a:off x="10660307" y="10978838"/>
+            <a:off x="10660307" y="13415360"/>
             <a:ext cx="1336544" cy="505145"/>
           </a:xfrm>
           <a:prstGeom prst="straightConnector1">
@@ -6286,7 +6286,7 @@
         </p:nvCxnSpPr>
         <p:spPr>
           <a:xfrm>
-            <a:off x="10660307" y="10978838"/>
+            <a:off x="10660307" y="13415360"/>
             <a:ext cx="1336544" cy="1653375"/>
           </a:xfrm>
           <a:prstGeom prst="straightConnector1">
@@ -6330,7 +6330,7 @@
         </p:nvSpPr>
         <p:spPr>
           <a:xfrm>
-            <a:off x="11309163" y="10166915"/>
+            <a:off x="11309163" y="12603437"/>
             <a:ext cx="1067551" cy="558224"/>
           </a:xfrm>
           <a:prstGeom prst="rect">
@@ -6532,7 +6532,7 @@
         </p:nvSpPr>
         <p:spPr>
           <a:xfrm>
-            <a:off x="11323123" y="10927752"/>
+            <a:off x="11323123" y="13364274"/>
             <a:ext cx="1067551" cy="558224"/>
           </a:xfrm>
           <a:prstGeom prst="rect">
@@ -6734,7 +6734,7 @@
         </p:nvSpPr>
         <p:spPr>
           <a:xfrm>
-            <a:off x="11406885" y="11667648"/>
+            <a:off x="11406885" y="14104170"/>
             <a:ext cx="1067551" cy="558224"/>
           </a:xfrm>
           <a:prstGeom prst="rect">
@@ -6934,7 +6934,7 @@
         </p:nvSpPr>
         <p:spPr>
           <a:xfrm>
-            <a:off x="13371840" y="8984214"/>
+            <a:off x="13371840" y="11420736"/>
             <a:ext cx="436182" cy="415153"/>
           </a:xfrm>
           <a:prstGeom prst="ellipse">
@@ -6994,7 +6994,7 @@
         </p:nvCxnSpPr>
         <p:spPr>
           <a:xfrm>
-            <a:off x="12583351" y="9189274"/>
+            <a:off x="12583351" y="11625796"/>
             <a:ext cx="724470" cy="0"/>
           </a:xfrm>
           <a:prstGeom prst="straightConnector1">
@@ -7038,7 +7038,7 @@
         </p:nvSpPr>
         <p:spPr>
           <a:xfrm>
-            <a:off x="12809815" y="8882727"/>
+            <a:off x="12809815" y="11319249"/>
             <a:ext cx="1067551" cy="558224"/>
           </a:xfrm>
           <a:prstGeom prst="rect">
@@ -7238,7 +7238,7 @@
         </p:nvSpPr>
         <p:spPr>
           <a:xfrm>
-            <a:off x="13389888" y="10158330"/>
+            <a:off x="13389888" y="12594852"/>
             <a:ext cx="436182" cy="415153"/>
           </a:xfrm>
           <a:prstGeom prst="ellipse">
@@ -7298,7 +7298,7 @@
         </p:nvCxnSpPr>
         <p:spPr>
           <a:xfrm>
-            <a:off x="12583351" y="10363168"/>
+            <a:off x="12583351" y="12799690"/>
             <a:ext cx="724470" cy="3525"/>
           </a:xfrm>
           <a:prstGeom prst="straightConnector1">
@@ -7342,7 +7342,7 @@
         </p:nvSpPr>
         <p:spPr>
           <a:xfrm>
-            <a:off x="12809815" y="10007334"/>
+            <a:off x="12809815" y="12443856"/>
             <a:ext cx="415939" cy="558224"/>
           </a:xfrm>
           <a:prstGeom prst="rect">
@@ -7542,7 +7542,7 @@
         </p:nvSpPr>
         <p:spPr>
           <a:xfrm>
-            <a:off x="13362456" y="11273898"/>
+            <a:off x="13362456" y="13710420"/>
             <a:ext cx="436182" cy="415153"/>
           </a:xfrm>
           <a:prstGeom prst="ellipse">
@@ -7598,7 +7598,7 @@
         </p:nvSpPr>
         <p:spPr>
           <a:xfrm>
-            <a:off x="13335024" y="12426042"/>
+            <a:off x="13335024" y="14862564"/>
             <a:ext cx="436182" cy="415153"/>
           </a:xfrm>
           <a:prstGeom prst="ellipse">
@@ -7658,7 +7658,7 @@
         </p:nvCxnSpPr>
         <p:spPr>
           <a:xfrm>
-            <a:off x="12583351" y="11483983"/>
+            <a:off x="12583351" y="13920505"/>
             <a:ext cx="707515" cy="0"/>
           </a:xfrm>
           <a:prstGeom prst="straightConnector1">
@@ -7704,7 +7704,7 @@
         </p:nvCxnSpPr>
         <p:spPr>
           <a:xfrm flipV="1">
-            <a:off x="12583351" y="12626178"/>
+            <a:off x="12583351" y="15062700"/>
             <a:ext cx="677618" cy="6035"/>
           </a:xfrm>
           <a:prstGeom prst="straightConnector1">
@@ -7748,7 +7748,7 @@
         </p:nvSpPr>
         <p:spPr>
           <a:xfrm>
-            <a:off x="12809815" y="11157057"/>
+            <a:off x="12809815" y="13593579"/>
             <a:ext cx="415939" cy="558224"/>
           </a:xfrm>
           <a:prstGeom prst="rect">
@@ -7950,7 +7950,7 @@
         </p:nvSpPr>
         <p:spPr>
           <a:xfrm>
-            <a:off x="12809815" y="12279886"/>
+            <a:off x="12809815" y="14716408"/>
             <a:ext cx="415939" cy="558224"/>
           </a:xfrm>
           <a:prstGeom prst="rect">
@@ -8150,7 +8150,7 @@
         </p:nvSpPr>
         <p:spPr>
           <a:xfrm>
-            <a:off x="10273543" y="16010799"/>
+            <a:off x="10273543" y="18569602"/>
             <a:ext cx="586500" cy="558224"/>
           </a:xfrm>
           <a:prstGeom prst="ellipse">
@@ -8190,7 +8190,7 @@
                   <a:schemeClr val="tx1"/>
                 </a:solidFill>
               </a:rPr>
-              <a:t>27</a:t>
+              <a:t>30</a:t>
             </a:r>
             <a:endParaRPr lang="en-KR" dirty="0">
               <a:solidFill>
@@ -8218,7 +8218,7 @@
         </p:nvCxnSpPr>
         <p:spPr>
           <a:xfrm>
-            <a:off x="10860043" y="16289911"/>
+            <a:off x="10860043" y="18848714"/>
             <a:ext cx="934545" cy="0"/>
           </a:xfrm>
           <a:prstGeom prst="straightConnector1">
@@ -8260,7 +8260,7 @@
         </p:nvSpPr>
         <p:spPr>
           <a:xfrm>
-            <a:off x="11794588" y="16010799"/>
+            <a:off x="11794588" y="18569602"/>
             <a:ext cx="586500" cy="558224"/>
           </a:xfrm>
           <a:prstGeom prst="ellipse">
@@ -8300,7 +8300,7 @@
                   <a:schemeClr val="tx1"/>
                 </a:solidFill>
               </a:rPr>
-              <a:t>28</a:t>
+              <a:t>31</a:t>
             </a:r>
             <a:endParaRPr lang="en-KR" dirty="0">
               <a:solidFill>
@@ -8326,7 +8326,7 @@
         </p:nvSpPr>
         <p:spPr>
           <a:xfrm>
-            <a:off x="10929300" y="15811402"/>
+            <a:off x="10929300" y="18370205"/>
             <a:ext cx="1067551" cy="558224"/>
           </a:xfrm>
           <a:prstGeom prst="rect">
@@ -8526,7 +8526,7 @@
         </p:nvSpPr>
         <p:spPr>
           <a:xfrm>
-            <a:off x="13711010" y="14330657"/>
+            <a:off x="13711010" y="16889460"/>
             <a:ext cx="586500" cy="558224"/>
           </a:xfrm>
           <a:prstGeom prst="ellipse">
@@ -8566,7 +8566,7 @@
                   <a:schemeClr val="tx1"/>
                 </a:solidFill>
               </a:rPr>
-              <a:t>29</a:t>
+              <a:t>32</a:t>
             </a:r>
             <a:endParaRPr lang="en-KR" dirty="0">
               <a:solidFill>
@@ -8590,7 +8590,7 @@
         </p:nvSpPr>
         <p:spPr>
           <a:xfrm>
-            <a:off x="13786169" y="14402192"/>
+            <a:off x="13786169" y="16960995"/>
             <a:ext cx="436182" cy="415153"/>
           </a:xfrm>
           <a:prstGeom prst="ellipse">
@@ -8650,7 +8650,7 @@
         </p:nvCxnSpPr>
         <p:spPr>
           <a:xfrm rot="16200000" flipH="1">
-            <a:off x="13806898" y="14402410"/>
+            <a:off x="13806898" y="16961213"/>
             <a:ext cx="394724" cy="414718"/>
           </a:xfrm>
           <a:prstGeom prst="curvedConnector5">
@@ -8698,7 +8698,7 @@
         </p:nvSpPr>
         <p:spPr>
           <a:xfrm>
-            <a:off x="12430145" y="15119424"/>
+            <a:off x="12430145" y="17678227"/>
             <a:ext cx="1792206" cy="558224"/>
           </a:xfrm>
           <a:prstGeom prst="rect">
@@ -8900,7 +8900,7 @@
         </p:nvSpPr>
         <p:spPr>
           <a:xfrm>
-            <a:off x="12328422" y="16902174"/>
+            <a:off x="12328422" y="19460977"/>
             <a:ext cx="1792206" cy="558224"/>
           </a:xfrm>
           <a:prstGeom prst="rect">
@@ -9100,7 +9100,7 @@
         </p:nvSpPr>
         <p:spPr>
           <a:xfrm>
-            <a:off x="13711010" y="17031624"/>
+            <a:off x="13711010" y="19590427"/>
             <a:ext cx="586500" cy="558224"/>
           </a:xfrm>
           <a:prstGeom prst="ellipse">
@@ -9140,7 +9140,7 @@
                   <a:schemeClr val="tx1"/>
                 </a:solidFill>
               </a:rPr>
-              <a:t>30</a:t>
+              <a:t>33</a:t>
             </a:r>
             <a:endParaRPr lang="en-KR" dirty="0">
               <a:solidFill>
@@ -9164,7 +9164,7 @@
         </p:nvSpPr>
         <p:spPr>
           <a:xfrm>
-            <a:off x="13786169" y="17103159"/>
+            <a:off x="13786169" y="19661962"/>
             <a:ext cx="436182" cy="415153"/>
           </a:xfrm>
           <a:prstGeom prst="ellipse">
@@ -9224,7 +9224,7 @@
         </p:nvCxnSpPr>
         <p:spPr>
           <a:xfrm flipV="1">
-            <a:off x="12381088" y="14807131"/>
+            <a:off x="12381088" y="17365934"/>
             <a:ext cx="1415813" cy="1482780"/>
           </a:xfrm>
           <a:prstGeom prst="straightConnector1">
@@ -9270,7 +9270,7 @@
         </p:nvCxnSpPr>
         <p:spPr>
           <a:xfrm>
-            <a:off x="12381088" y="16289911"/>
+            <a:off x="12381088" y="18848714"/>
             <a:ext cx="1329922" cy="1020825"/>
           </a:xfrm>
           <a:prstGeom prst="straightConnector1">
@@ -9316,7 +9316,7 @@
         </p:nvCxnSpPr>
         <p:spPr>
           <a:xfrm flipH="1" flipV="1">
-            <a:off x="13796901" y="14807131"/>
+            <a:off x="13796901" y="17365934"/>
             <a:ext cx="361573" cy="2356826"/>
           </a:xfrm>
           <a:prstGeom prst="straightConnector1">
@@ -9362,7 +9362,7 @@
         </p:nvCxnSpPr>
         <p:spPr>
           <a:xfrm flipH="1">
-            <a:off x="13711010" y="14807131"/>
+            <a:off x="13711010" y="17365934"/>
             <a:ext cx="500609" cy="2503605"/>
           </a:xfrm>
           <a:prstGeom prst="straightConnector1">
@@ -9406,7 +9406,7 @@
         </p:nvSpPr>
         <p:spPr>
           <a:xfrm>
-            <a:off x="14049937" y="16230056"/>
+            <a:off x="14049937" y="18788859"/>
             <a:ext cx="1792206" cy="558224"/>
           </a:xfrm>
           <a:prstGeom prst="rect">
@@ -9608,7 +9608,7 @@
         </p:nvSpPr>
         <p:spPr>
           <a:xfrm>
-            <a:off x="13199144" y="16391346"/>
+            <a:off x="13199144" y="18950149"/>
             <a:ext cx="1792206" cy="558224"/>
           </a:xfrm>
           <a:prstGeom prst="rect">
@@ -9810,7 +9810,7 @@
         </p:nvSpPr>
         <p:spPr>
           <a:xfrm>
-            <a:off x="14818220" y="14226986"/>
+            <a:off x="14818220" y="16785789"/>
             <a:ext cx="1792206" cy="558224"/>
           </a:xfrm>
           <a:prstGeom prst="rect">
@@ -10014,7 +10014,7 @@
         </p:nvCxnSpPr>
         <p:spPr>
           <a:xfrm flipH="1">
-            <a:off x="13796901" y="17310736"/>
+            <a:off x="13796901" y="19869539"/>
             <a:ext cx="500609" cy="197362"/>
           </a:xfrm>
           <a:prstGeom prst="curvedConnector4">
@@ -10061,7 +10061,7 @@
         </p:nvSpPr>
         <p:spPr>
           <a:xfrm>
-            <a:off x="14150605" y="17823964"/>
+            <a:off x="14150605" y="20382767"/>
             <a:ext cx="1792206" cy="558224"/>
           </a:xfrm>
           <a:prstGeom prst="rect">
@@ -10261,7 +10261,7 @@
         </p:nvSpPr>
         <p:spPr>
           <a:xfrm>
-            <a:off x="11865090" y="16096480"/>
+            <a:off x="11865090" y="18655283"/>
             <a:ext cx="436182" cy="415153"/>
           </a:xfrm>
           <a:prstGeom prst="ellipse">
@@ -10317,7 +10317,7 @@
         </p:nvSpPr>
         <p:spPr>
           <a:xfrm>
-            <a:off x="10002934" y="21760074"/>
+            <a:off x="10002935" y="24159772"/>
             <a:ext cx="586500" cy="558224"/>
           </a:xfrm>
           <a:prstGeom prst="ellipse">
@@ -10357,7 +10357,7 @@
                   <a:schemeClr val="tx1"/>
                 </a:solidFill>
               </a:rPr>
-              <a:t>32</a:t>
+              <a:t>35</a:t>
             </a:r>
             <a:endParaRPr lang="en-KR" dirty="0">
               <a:solidFill>
@@ -10385,7 +10385,7 @@
         </p:nvCxnSpPr>
         <p:spPr>
           <a:xfrm>
-            <a:off x="10589434" y="22039186"/>
+            <a:off x="10589435" y="24438884"/>
             <a:ext cx="531661" cy="0"/>
           </a:xfrm>
           <a:prstGeom prst="straightConnector1">
@@ -10427,7 +10427,7 @@
         </p:nvSpPr>
         <p:spPr>
           <a:xfrm>
-            <a:off x="11121095" y="21760074"/>
+            <a:off x="11121096" y="24159772"/>
             <a:ext cx="586500" cy="558224"/>
           </a:xfrm>
           <a:prstGeom prst="ellipse">
@@ -10467,7 +10467,7 @@
                   <a:schemeClr val="tx1"/>
                 </a:solidFill>
               </a:rPr>
-              <a:t>33</a:t>
+              <a:t>36</a:t>
             </a:r>
             <a:endParaRPr lang="en-KR" dirty="0">
               <a:solidFill>
@@ -10493,7 +10493,7 @@
         </p:nvSpPr>
         <p:spPr>
           <a:xfrm>
-            <a:off x="10718734" y="21760074"/>
+            <a:off x="10718735" y="24159772"/>
             <a:ext cx="457200" cy="558224"/>
           </a:xfrm>
           <a:prstGeom prst="rect">
@@ -10693,7 +10693,7 @@
         </p:nvSpPr>
         <p:spPr>
           <a:xfrm>
-            <a:off x="15741221" y="21760074"/>
+            <a:off x="15741222" y="24159772"/>
             <a:ext cx="586500" cy="558224"/>
           </a:xfrm>
           <a:prstGeom prst="ellipse">
@@ -10733,7 +10733,7 @@
                   <a:schemeClr val="tx1"/>
                 </a:solidFill>
               </a:rPr>
-              <a:t>37</a:t>
+              <a:t>40</a:t>
             </a:r>
             <a:endParaRPr lang="en-KR" dirty="0">
               <a:solidFill>
@@ -10757,7 +10757,7 @@
         </p:nvSpPr>
         <p:spPr>
           <a:xfrm>
-            <a:off x="13530051" y="20073570"/>
+            <a:off x="13530052" y="22473268"/>
             <a:ext cx="586500" cy="558224"/>
           </a:xfrm>
           <a:prstGeom prst="ellipse">
@@ -10797,7 +10797,7 @@
                   <a:schemeClr val="tx1"/>
                 </a:solidFill>
               </a:rPr>
-              <a:t>34</a:t>
+              <a:t>37</a:t>
             </a:r>
             <a:endParaRPr lang="en-KR" dirty="0">
               <a:solidFill>
@@ -10821,7 +10821,7 @@
         </p:nvSpPr>
         <p:spPr>
           <a:xfrm>
-            <a:off x="13530051" y="23510478"/>
+            <a:off x="13530052" y="25910176"/>
             <a:ext cx="586500" cy="558224"/>
           </a:xfrm>
           <a:prstGeom prst="ellipse">
@@ -10861,7 +10861,7 @@
                   <a:schemeClr val="tx1"/>
                 </a:solidFill>
               </a:rPr>
-              <a:t>36</a:t>
+              <a:t>39</a:t>
             </a:r>
             <a:endParaRPr lang="en-KR" dirty="0">
               <a:solidFill>
@@ -10885,7 +10885,7 @@
         </p:nvSpPr>
         <p:spPr>
           <a:xfrm>
-            <a:off x="13530051" y="21737043"/>
+            <a:off x="13530052" y="24136741"/>
             <a:ext cx="586500" cy="558224"/>
           </a:xfrm>
           <a:prstGeom prst="ellipse">
@@ -10925,7 +10925,7 @@
                   <a:schemeClr val="tx1"/>
                 </a:solidFill>
               </a:rPr>
-              <a:t>35</a:t>
+              <a:t>38</a:t>
             </a:r>
             <a:endParaRPr lang="en-KR" dirty="0">
               <a:solidFill>
@@ -10949,7 +10949,7 @@
         </p:nvSpPr>
         <p:spPr>
           <a:xfrm>
-            <a:off x="15816380" y="21831609"/>
+            <a:off x="15816381" y="24231307"/>
             <a:ext cx="436182" cy="415153"/>
           </a:xfrm>
           <a:prstGeom prst="ellipse">
@@ -11009,7 +11009,7 @@
         </p:nvCxnSpPr>
         <p:spPr>
           <a:xfrm rot="5400000" flipH="1" flipV="1">
-            <a:off x="13787212" y="19594566"/>
+            <a:off x="13787213" y="21994264"/>
             <a:ext cx="81750" cy="4412767"/>
           </a:xfrm>
           <a:prstGeom prst="curvedConnector3">
@@ -11055,7 +11055,7 @@
         </p:nvSpPr>
         <p:spPr>
           <a:xfrm>
-            <a:off x="13684435" y="19172334"/>
+            <a:off x="13684436" y="21572032"/>
             <a:ext cx="457200" cy="558224"/>
           </a:xfrm>
           <a:prstGeom prst="rect">
@@ -11259,7 +11259,7 @@
         </p:nvCxnSpPr>
         <p:spPr>
           <a:xfrm flipV="1">
-            <a:off x="11707595" y="20352682"/>
+            <a:off x="11707596" y="22752380"/>
             <a:ext cx="1822456" cy="1686504"/>
           </a:xfrm>
           <a:prstGeom prst="straightConnector1">
@@ -11305,7 +11305,7 @@
         </p:nvCxnSpPr>
         <p:spPr>
           <a:xfrm flipV="1">
-            <a:off x="11707595" y="22016155"/>
+            <a:off x="11707596" y="24415853"/>
             <a:ext cx="1822456" cy="23031"/>
           </a:xfrm>
           <a:prstGeom prst="straightConnector1">
@@ -11351,7 +11351,7 @@
         </p:nvCxnSpPr>
         <p:spPr>
           <a:xfrm>
-            <a:off x="11707595" y="22039186"/>
+            <a:off x="11707596" y="24438884"/>
             <a:ext cx="1822456" cy="1750404"/>
           </a:xfrm>
           <a:prstGeom prst="straightConnector1">
@@ -11397,7 +11397,7 @@
         </p:nvCxnSpPr>
         <p:spPr>
           <a:xfrm>
-            <a:off x="14116551" y="22016155"/>
+            <a:off x="14116552" y="24415853"/>
             <a:ext cx="1624670" cy="23031"/>
           </a:xfrm>
           <a:prstGeom prst="straightConnector1">
@@ -11441,7 +11441,7 @@
         </p:nvSpPr>
         <p:spPr>
           <a:xfrm>
-            <a:off x="14931718" y="21760074"/>
+            <a:off x="14931719" y="24159772"/>
             <a:ext cx="457200" cy="558224"/>
           </a:xfrm>
           <a:prstGeom prst="rect">
@@ -11643,7 +11643,7 @@
         </p:nvSpPr>
         <p:spPr>
           <a:xfrm>
-            <a:off x="11947327" y="20853037"/>
+            <a:off x="11947328" y="23252735"/>
             <a:ext cx="1792206" cy="558224"/>
           </a:xfrm>
           <a:prstGeom prst="rect">
@@ -11845,7 +11845,7 @@
         </p:nvSpPr>
         <p:spPr>
           <a:xfrm>
-            <a:off x="12055315" y="21975280"/>
+            <a:off x="12055316" y="24374978"/>
             <a:ext cx="1792206" cy="558224"/>
           </a:xfrm>
           <a:prstGeom prst="rect">
@@ -12049,7 +12049,7 @@
         </p:nvCxnSpPr>
         <p:spPr>
           <a:xfrm flipV="1">
-            <a:off x="13823301" y="20631794"/>
+            <a:off x="13823302" y="23031492"/>
             <a:ext cx="0" cy="1105249"/>
           </a:xfrm>
           <a:prstGeom prst="straightConnector1">
@@ -12095,7 +12095,7 @@
         </p:nvCxnSpPr>
         <p:spPr>
           <a:xfrm flipV="1">
-            <a:off x="13823301" y="22295267"/>
+            <a:off x="13823302" y="24694965"/>
             <a:ext cx="0" cy="1215211"/>
           </a:xfrm>
           <a:prstGeom prst="straightConnector1">
@@ -12141,7 +12141,7 @@
         </p:nvCxnSpPr>
         <p:spPr>
           <a:xfrm>
-            <a:off x="14116551" y="20352682"/>
+            <a:off x="14116552" y="22752380"/>
             <a:ext cx="12700" cy="1663473"/>
           </a:xfrm>
           <a:prstGeom prst="curvedConnector3">
@@ -12189,7 +12189,7 @@
         </p:nvCxnSpPr>
         <p:spPr>
           <a:xfrm>
-            <a:off x="14116551" y="20352682"/>
+            <a:off x="14116552" y="22752380"/>
             <a:ext cx="12700" cy="3436908"/>
           </a:xfrm>
           <a:prstGeom prst="curvedConnector3">
@@ -12235,7 +12235,7 @@
         </p:nvSpPr>
         <p:spPr>
           <a:xfrm>
-            <a:off x="13165609" y="22533033"/>
+            <a:off x="13165610" y="24932731"/>
             <a:ext cx="1792206" cy="558224"/>
           </a:xfrm>
           <a:prstGeom prst="rect">
@@ -12437,7 +12437,7 @@
         </p:nvSpPr>
         <p:spPr>
           <a:xfrm>
-            <a:off x="13016932" y="21097187"/>
+            <a:off x="13016933" y="23496885"/>
             <a:ext cx="1792206" cy="558224"/>
           </a:xfrm>
           <a:prstGeom prst="rect">
@@ -12639,7 +12639,7 @@
         </p:nvSpPr>
         <p:spPr>
           <a:xfrm>
-            <a:off x="14314269" y="20925443"/>
+            <a:off x="14314270" y="23325141"/>
             <a:ext cx="1792206" cy="558224"/>
           </a:xfrm>
           <a:prstGeom prst="rect">
@@ -12843,7 +12843,7 @@
         </p:nvCxnSpPr>
         <p:spPr>
           <a:xfrm>
-            <a:off x="14116551" y="22016155"/>
+            <a:off x="14116552" y="24415853"/>
             <a:ext cx="12700" cy="1773435"/>
           </a:xfrm>
           <a:prstGeom prst="curvedConnector3">
@@ -12891,7 +12891,7 @@
         </p:nvCxnSpPr>
         <p:spPr>
           <a:xfrm rot="16200000" flipV="1">
-            <a:off x="12446764" y="22008331"/>
+            <a:off x="12446765" y="24408029"/>
             <a:ext cx="2960434" cy="207359"/>
           </a:xfrm>
           <a:prstGeom prst="curvedConnector3">
@@ -12937,7 +12937,7 @@
         </p:nvSpPr>
         <p:spPr>
           <a:xfrm>
-            <a:off x="13752109" y="20747641"/>
+            <a:off x="13752110" y="23147339"/>
             <a:ext cx="1792206" cy="558224"/>
           </a:xfrm>
           <a:prstGeom prst="rect">
@@ -13137,7 +13137,7 @@
         </p:nvSpPr>
         <p:spPr>
           <a:xfrm>
-            <a:off x="10049485" y="26140216"/>
+            <a:off x="10049486" y="28677972"/>
             <a:ext cx="586500" cy="558224"/>
           </a:xfrm>
           <a:prstGeom prst="ellipse">
@@ -13177,7 +13177,7 @@
                   <a:schemeClr val="tx1"/>
                 </a:solidFill>
               </a:rPr>
-              <a:t>39</a:t>
+              <a:t>42</a:t>
             </a:r>
             <a:endParaRPr lang="en-KR" dirty="0">
               <a:solidFill>
@@ -13205,7 +13205,7 @@
         </p:nvCxnSpPr>
         <p:spPr>
           <a:xfrm>
-            <a:off x="10635985" y="26419328"/>
+            <a:off x="10635986" y="28957084"/>
             <a:ext cx="531661" cy="0"/>
           </a:xfrm>
           <a:prstGeom prst="straightConnector1">
@@ -13247,7 +13247,7 @@
         </p:nvSpPr>
         <p:spPr>
           <a:xfrm>
-            <a:off x="11167646" y="26140216"/>
+            <a:off x="11167647" y="28677972"/>
             <a:ext cx="586500" cy="558224"/>
           </a:xfrm>
           <a:prstGeom prst="ellipse">
@@ -13287,7 +13287,7 @@
                   <a:schemeClr val="tx1"/>
                 </a:solidFill>
               </a:rPr>
-              <a:t>40</a:t>
+              <a:t>43</a:t>
             </a:r>
             <a:endParaRPr lang="en-KR" dirty="0">
               <a:solidFill>
@@ -13313,7 +13313,7 @@
         </p:nvSpPr>
         <p:spPr>
           <a:xfrm>
-            <a:off x="10765285" y="26140216"/>
+            <a:off x="10765286" y="28677972"/>
             <a:ext cx="457200" cy="558224"/>
           </a:xfrm>
           <a:prstGeom prst="rect">
@@ -13513,7 +13513,7 @@
         </p:nvSpPr>
         <p:spPr>
           <a:xfrm>
-            <a:off x="14187572" y="26140216"/>
+            <a:off x="14187573" y="28677972"/>
             <a:ext cx="586500" cy="558224"/>
           </a:xfrm>
           <a:prstGeom prst="ellipse">
@@ -13553,7 +13553,7 @@
                   <a:schemeClr val="tx1"/>
                 </a:solidFill>
               </a:rPr>
-              <a:t>44</a:t>
+              <a:t>47</a:t>
             </a:r>
             <a:endParaRPr lang="en-KR" dirty="0">
               <a:solidFill>
@@ -13577,7 +13577,7 @@
         </p:nvSpPr>
         <p:spPr>
           <a:xfrm>
-            <a:off x="12844449" y="25268988"/>
+            <a:off x="12844450" y="27806744"/>
             <a:ext cx="586500" cy="558224"/>
           </a:xfrm>
           <a:prstGeom prst="ellipse">
@@ -13617,7 +13617,7 @@
                   <a:schemeClr val="tx1"/>
                 </a:solidFill>
               </a:rPr>
-              <a:t>41</a:t>
+              <a:t>44</a:t>
             </a:r>
             <a:endParaRPr lang="en-KR" dirty="0">
               <a:solidFill>
@@ -13641,7 +13641,7 @@
         </p:nvSpPr>
         <p:spPr>
           <a:xfrm>
-            <a:off x="12844449" y="26965382"/>
+            <a:off x="12844450" y="29503138"/>
             <a:ext cx="586500" cy="558224"/>
           </a:xfrm>
           <a:prstGeom prst="ellipse">
@@ -13681,7 +13681,7 @@
                   <a:schemeClr val="tx1"/>
                 </a:solidFill>
               </a:rPr>
-              <a:t>43</a:t>
+              <a:t>46</a:t>
             </a:r>
             <a:endParaRPr lang="en-KR" dirty="0">
               <a:solidFill>
@@ -13705,7 +13705,7 @@
         </p:nvSpPr>
         <p:spPr>
           <a:xfrm>
-            <a:off x="12844449" y="26117185"/>
+            <a:off x="12844450" y="28654941"/>
             <a:ext cx="586500" cy="558224"/>
           </a:xfrm>
           <a:prstGeom prst="ellipse">
@@ -13745,7 +13745,7 @@
                   <a:schemeClr val="tx1"/>
                 </a:solidFill>
               </a:rPr>
-              <a:t>42</a:t>
+              <a:t>45</a:t>
             </a:r>
             <a:endParaRPr lang="en-KR" dirty="0">
               <a:solidFill>
@@ -13769,7 +13769,7 @@
         </p:nvSpPr>
         <p:spPr>
           <a:xfrm>
-            <a:off x="14262731" y="26211751"/>
+            <a:off x="14262732" y="28749507"/>
             <a:ext cx="436182" cy="415153"/>
           </a:xfrm>
           <a:prstGeom prst="ellipse">
@@ -13829,7 +13829,7 @@
         </p:nvCxnSpPr>
         <p:spPr>
           <a:xfrm rot="5400000" flipH="1" flipV="1">
-            <a:off x="13033663" y="24774808"/>
+            <a:off x="13033664" y="27312564"/>
             <a:ext cx="81750" cy="2812567"/>
           </a:xfrm>
           <a:prstGeom prst="curvedConnector3">
@@ -13875,7 +13875,7 @@
         </p:nvSpPr>
         <p:spPr>
           <a:xfrm>
-            <a:off x="12973749" y="24593947"/>
+            <a:off x="12973750" y="27131703"/>
             <a:ext cx="457200" cy="558224"/>
           </a:xfrm>
           <a:prstGeom prst="rect">
@@ -14079,7 +14079,7 @@
         </p:nvCxnSpPr>
         <p:spPr>
           <a:xfrm flipV="1">
-            <a:off x="11754146" y="25548100"/>
+            <a:off x="11754147" y="28085856"/>
             <a:ext cx="1090303" cy="871228"/>
           </a:xfrm>
           <a:prstGeom prst="straightConnector1">
@@ -14125,7 +14125,7 @@
         </p:nvCxnSpPr>
         <p:spPr>
           <a:xfrm flipV="1">
-            <a:off x="11754146" y="26396297"/>
+            <a:off x="11754147" y="28934053"/>
             <a:ext cx="1090303" cy="23031"/>
           </a:xfrm>
           <a:prstGeom prst="straightConnector1">
@@ -14171,7 +14171,7 @@
         </p:nvCxnSpPr>
         <p:spPr>
           <a:xfrm>
-            <a:off x="11754146" y="26419328"/>
+            <a:off x="11754147" y="28957084"/>
             <a:ext cx="1090303" cy="825166"/>
           </a:xfrm>
           <a:prstGeom prst="straightConnector1">
@@ -14217,7 +14217,7 @@
         </p:nvCxnSpPr>
         <p:spPr>
           <a:xfrm>
-            <a:off x="13430949" y="26396297"/>
+            <a:off x="13430950" y="28934053"/>
             <a:ext cx="756623" cy="23031"/>
           </a:xfrm>
           <a:prstGeom prst="straightConnector1">
@@ -14261,7 +14261,7 @@
         </p:nvSpPr>
         <p:spPr>
           <a:xfrm>
-            <a:off x="13706152" y="26140216"/>
+            <a:off x="13706153" y="28677972"/>
             <a:ext cx="457200" cy="558224"/>
           </a:xfrm>
           <a:prstGeom prst="rect">
@@ -14463,7 +14463,7 @@
         </p:nvSpPr>
         <p:spPr>
           <a:xfrm>
-            <a:off x="11858794" y="25504905"/>
+            <a:off x="11858795" y="28042661"/>
             <a:ext cx="1792206" cy="558224"/>
           </a:xfrm>
           <a:prstGeom prst="rect">
@@ -14665,7 +14665,7 @@
         </p:nvSpPr>
         <p:spPr>
           <a:xfrm>
-            <a:off x="12101866" y="26355422"/>
+            <a:off x="12101867" y="28893178"/>
             <a:ext cx="1792206" cy="558224"/>
           </a:xfrm>
           <a:prstGeom prst="rect">
@@ -14867,7 +14867,7 @@
         </p:nvSpPr>
         <p:spPr>
           <a:xfrm>
-            <a:off x="12077646" y="26930900"/>
+            <a:off x="12077647" y="29468656"/>
             <a:ext cx="1792206" cy="558224"/>
           </a:xfrm>
           <a:prstGeom prst="rect">
@@ -15067,7 +15067,7 @@
         </p:nvSpPr>
         <p:spPr>
           <a:xfrm>
-            <a:off x="10069557" y="30119851"/>
+            <a:off x="10069557" y="32515598"/>
             <a:ext cx="586500" cy="558224"/>
           </a:xfrm>
           <a:prstGeom prst="ellipse">
@@ -15107,7 +15107,7 @@
                   <a:schemeClr val="tx1"/>
                 </a:solidFill>
               </a:rPr>
-              <a:t>46</a:t>
+              <a:t>49</a:t>
             </a:r>
             <a:endParaRPr lang="en-KR" dirty="0">
               <a:solidFill>
@@ -15131,7 +15131,7 @@
         </p:nvSpPr>
         <p:spPr>
           <a:xfrm>
-            <a:off x="12644419" y="30036753"/>
+            <a:off x="12644419" y="32432500"/>
             <a:ext cx="586500" cy="558224"/>
           </a:xfrm>
           <a:prstGeom prst="ellipse">
@@ -15171,7 +15171,7 @@
                   <a:schemeClr val="tx1"/>
                 </a:solidFill>
               </a:rPr>
-              <a:t>48</a:t>
+              <a:t>51</a:t>
             </a:r>
             <a:endParaRPr lang="en-KR" dirty="0">
               <a:solidFill>
@@ -15195,7 +15195,7 @@
         </p:nvSpPr>
         <p:spPr>
           <a:xfrm>
-            <a:off x="12197746" y="31496693"/>
+            <a:off x="12197746" y="33892440"/>
             <a:ext cx="586500" cy="558224"/>
           </a:xfrm>
           <a:prstGeom prst="ellipse">
@@ -15230,12 +15230,12 @@
           <a:p>
             <a:pPr algn="ctr"/>
             <a:r>
-              <a:rPr lang="en-US" altLang="ko-KR" dirty="0">
+              <a:rPr lang="en-US" dirty="0">
                 <a:solidFill>
                   <a:schemeClr val="tx1"/>
                 </a:solidFill>
               </a:rPr>
-              <a:t>50</a:t>
+              <a:t>52</a:t>
             </a:r>
             <a:endParaRPr lang="en-KR" dirty="0">
               <a:solidFill>
@@ -15259,7 +15259,7 @@
         </p:nvSpPr>
         <p:spPr>
           <a:xfrm>
-            <a:off x="14437513" y="30036753"/>
+            <a:off x="14437513" y="32432500"/>
             <a:ext cx="586500" cy="558224"/>
           </a:xfrm>
           <a:prstGeom prst="ellipse">
@@ -15299,7 +15299,7 @@
                   <a:schemeClr val="tx1"/>
                 </a:solidFill>
               </a:rPr>
-              <a:t>49</a:t>
+              <a:t>53</a:t>
             </a:r>
             <a:endParaRPr lang="en-KR" dirty="0">
               <a:solidFill>
@@ -15327,7 +15327,7 @@
         </p:nvCxnSpPr>
         <p:spPr>
           <a:xfrm flipV="1">
-            <a:off x="10656057" y="29090091"/>
+            <a:off x="10656057" y="31485838"/>
             <a:ext cx="1994489" cy="1308872"/>
           </a:xfrm>
           <a:prstGeom prst="straightConnector1">
@@ -15373,7 +15373,7 @@
         </p:nvCxnSpPr>
         <p:spPr>
           <a:xfrm flipV="1">
-            <a:off x="10656057" y="30315865"/>
+            <a:off x="10656057" y="32711612"/>
             <a:ext cx="1988362" cy="83098"/>
           </a:xfrm>
           <a:prstGeom prst="straightConnector1">
@@ -15419,7 +15419,7 @@
         </p:nvCxnSpPr>
         <p:spPr>
           <a:xfrm>
-            <a:off x="10656057" y="30398963"/>
+            <a:off x="10656057" y="32794710"/>
             <a:ext cx="1541689" cy="1376842"/>
           </a:xfrm>
           <a:prstGeom prst="straightConnector1">
@@ -15463,7 +15463,7 @@
         </p:nvSpPr>
         <p:spPr>
           <a:xfrm>
-            <a:off x="11173962" y="29384339"/>
+            <a:off x="11173962" y="31780086"/>
             <a:ext cx="457200" cy="558224"/>
           </a:xfrm>
           <a:prstGeom prst="rect">
@@ -15665,7 +15665,7 @@
         </p:nvSpPr>
         <p:spPr>
           <a:xfrm>
-            <a:off x="11437825" y="29923837"/>
+            <a:off x="11437825" y="32319584"/>
             <a:ext cx="1519842" cy="558224"/>
           </a:xfrm>
           <a:prstGeom prst="rect">
@@ -15867,7 +15867,7 @@
         </p:nvSpPr>
         <p:spPr>
           <a:xfrm>
-            <a:off x="11135335" y="31135482"/>
+            <a:off x="11135335" y="33531229"/>
             <a:ext cx="467161" cy="558224"/>
           </a:xfrm>
           <a:prstGeom prst="rect">
@@ -16067,7 +16067,7 @@
         </p:nvSpPr>
         <p:spPr>
           <a:xfrm>
-            <a:off x="12564655" y="28613617"/>
+            <a:off x="12564655" y="31009364"/>
             <a:ext cx="586500" cy="558224"/>
           </a:xfrm>
           <a:prstGeom prst="ellipse">
@@ -16107,7 +16107,7 @@
                   <a:schemeClr val="tx1"/>
                 </a:solidFill>
               </a:rPr>
-              <a:t>47</a:t>
+              <a:t>50</a:t>
             </a:r>
             <a:endParaRPr lang="en-KR" dirty="0">
               <a:solidFill>
@@ -16131,7 +16131,7 @@
         </p:nvSpPr>
         <p:spPr>
           <a:xfrm>
-            <a:off x="12644419" y="28685152"/>
+            <a:off x="12644419" y="31080899"/>
             <a:ext cx="436182" cy="415153"/>
           </a:xfrm>
           <a:prstGeom prst="ellipse">
@@ -16191,7 +16191,7 @@
         </p:nvCxnSpPr>
         <p:spPr>
           <a:xfrm rot="16200000" flipH="1">
-            <a:off x="14596205" y="30171311"/>
+            <a:off x="14596205" y="32567058"/>
             <a:ext cx="476474" cy="207359"/>
           </a:xfrm>
           <a:prstGeom prst="curvedConnector5">
@@ -16239,7 +16239,7 @@
         </p:nvSpPr>
         <p:spPr>
           <a:xfrm>
-            <a:off x="13404340" y="29911735"/>
+            <a:off x="13404340" y="32307482"/>
             <a:ext cx="1519842" cy="558224"/>
           </a:xfrm>
           <a:prstGeom prst="rect">
@@ -16443,7 +16443,7 @@
         </p:nvCxnSpPr>
         <p:spPr>
           <a:xfrm>
-            <a:off x="13230919" y="30315865"/>
+            <a:off x="13230919" y="32711612"/>
             <a:ext cx="1206594" cy="0"/>
           </a:xfrm>
           <a:prstGeom prst="straightConnector1">
@@ -16489,7 +16489,7 @@
         </p:nvCxnSpPr>
         <p:spPr>
           <a:xfrm flipV="1">
-            <a:off x="12490996" y="30594977"/>
+            <a:off x="12490996" y="32990724"/>
             <a:ext cx="446673" cy="901716"/>
           </a:xfrm>
           <a:prstGeom prst="straightConnector1">
@@ -16533,7 +16533,7 @@
         </p:nvSpPr>
         <p:spPr>
           <a:xfrm>
-            <a:off x="12564655" y="31130689"/>
+            <a:off x="12564655" y="33526436"/>
             <a:ext cx="1519842" cy="558224"/>
           </a:xfrm>
           <a:prstGeom prst="rect">
@@ -16735,7 +16735,7 @@
         </p:nvSpPr>
         <p:spPr>
           <a:xfrm>
-            <a:off x="15111220" y="29576455"/>
+            <a:off x="15111220" y="31972202"/>
             <a:ext cx="1519842" cy="558224"/>
           </a:xfrm>
           <a:prstGeom prst="rect">
@@ -16935,7 +16935,7 @@
         </p:nvSpPr>
         <p:spPr>
           <a:xfrm>
-            <a:off x="14515260" y="30104048"/>
+            <a:off x="14515260" y="32499795"/>
             <a:ext cx="436182" cy="415153"/>
           </a:xfrm>
           <a:prstGeom prst="ellipse">
@@ -17053,14 +17053,14 @@
           <p:cNvCxnSpPr>
             <a:cxnSpLocks/>
             <a:stCxn id="199" idx="6"/>
-            <a:endCxn id="46" idx="3"/>
+            <a:endCxn id="467" idx="3"/>
           </p:cNvCxnSpPr>
           <p:nvPr/>
         </p:nvCxnSpPr>
         <p:spPr>
           <a:xfrm flipV="1">
-            <a:off x="8980969" y="2266038"/>
-            <a:ext cx="1422326" cy="1612885"/>
+            <a:off x="8980969" y="2191553"/>
+            <a:ext cx="818969" cy="1687370"/>
           </a:xfrm>
           <a:prstGeom prst="straightConnector1">
             <a:avLst/>
@@ -17098,15 +17098,15 @@
           </p:cNvPr>
           <p:cNvCxnSpPr>
             <a:cxnSpLocks/>
-            <a:stCxn id="199" idx="6"/>
+            <a:stCxn id="199" idx="4"/>
             <a:endCxn id="63" idx="2"/>
           </p:cNvCxnSpPr>
           <p:nvPr/>
         </p:nvCxnSpPr>
         <p:spPr>
           <a:xfrm>
-            <a:off x="8980969" y="3878923"/>
-            <a:ext cx="1335066" cy="2213113"/>
+            <a:off x="8687719" y="4158035"/>
+            <a:ext cx="2447620" cy="4109398"/>
           </a:xfrm>
           <a:prstGeom prst="straightConnector1">
             <a:avLst/>
@@ -17262,7 +17262,7 @@
         <p:spPr>
           <a:xfrm>
             <a:off x="7920265" y="7938859"/>
-            <a:ext cx="2153542" cy="3039979"/>
+            <a:ext cx="2153542" cy="5476501"/>
           </a:xfrm>
           <a:prstGeom prst="straightConnector1">
             <a:avLst/>
@@ -17418,7 +17418,7 @@
         <p:spPr>
           <a:xfrm>
             <a:off x="6505257" y="13434473"/>
-            <a:ext cx="3768286" cy="2855438"/>
+            <a:ext cx="3768286" cy="5414241"/>
           </a:xfrm>
           <a:prstGeom prst="straightConnector1">
             <a:avLst/>
@@ -17574,7 +17574,7 @@
         <p:spPr>
           <a:xfrm>
             <a:off x="5463338" y="18390620"/>
-            <a:ext cx="4539596" cy="3648566"/>
+            <a:ext cx="4539597" cy="6048264"/>
           </a:xfrm>
           <a:prstGeom prst="straightConnector1">
             <a:avLst/>
@@ -17684,7 +17684,7 @@
         <p:spPr>
           <a:xfrm>
             <a:off x="4143007" y="22994723"/>
-            <a:ext cx="5906478" cy="3424605"/>
+            <a:ext cx="5906479" cy="5962361"/>
           </a:xfrm>
           <a:prstGeom prst="straightConnector1">
             <a:avLst/>
@@ -17840,7 +17840,7 @@
         <p:spPr>
           <a:xfrm>
             <a:off x="2963141" y="27192695"/>
-            <a:ext cx="7106416" cy="3206268"/>
+            <a:ext cx="7106416" cy="5602015"/>
           </a:xfrm>
           <a:prstGeom prst="straightConnector1">
             <a:avLst/>
@@ -17967,7 +17967,7 @@
                   <a:schemeClr val="tx1"/>
                 </a:solidFill>
               </a:rPr>
-              <a:t>16</a:t>
+              <a:t>19</a:t>
             </a:r>
             <a:endParaRPr lang="en-KR" dirty="0">
               <a:solidFill>
@@ -17988,14 +17988,15 @@
           </p:cNvPr>
           <p:cNvCxnSpPr>
             <a:cxnSpLocks/>
-            <a:endCxn id="273" idx="2"/>
+            <a:stCxn id="47" idx="5"/>
+            <a:endCxn id="509" idx="2"/>
           </p:cNvCxnSpPr>
           <p:nvPr/>
         </p:nvCxnSpPr>
         <p:spPr>
           <a:xfrm>
-            <a:off x="12809815" y="429924"/>
-            <a:ext cx="4689445" cy="3562623"/>
+            <a:off x="12741057" y="476474"/>
+            <a:ext cx="3282869" cy="1517717"/>
           </a:xfrm>
           <a:prstGeom prst="straightConnector1">
             <a:avLst/>
@@ -18034,14 +18035,14 @@
           <p:cNvCxnSpPr>
             <a:cxnSpLocks/>
             <a:stCxn id="49" idx="6"/>
-            <a:endCxn id="273" idx="2"/>
+            <a:endCxn id="509" idx="2"/>
           </p:cNvCxnSpPr>
           <p:nvPr/>
         </p:nvCxnSpPr>
         <p:spPr>
           <a:xfrm>
             <a:off x="12826948" y="1453006"/>
-            <a:ext cx="4672312" cy="2539541"/>
+            <a:ext cx="3196978" cy="541185"/>
           </a:xfrm>
           <a:prstGeom prst="straightConnector1">
             <a:avLst/>
@@ -18080,14 +18081,14 @@
           <p:cNvCxnSpPr>
             <a:cxnSpLocks/>
             <a:stCxn id="50" idx="6"/>
-            <a:endCxn id="273" idx="2"/>
+            <a:endCxn id="509" idx="2"/>
           </p:cNvCxnSpPr>
           <p:nvPr/>
         </p:nvCxnSpPr>
         <p:spPr>
-          <a:xfrm>
-            <a:off x="12826948" y="2573821"/>
-            <a:ext cx="4672312" cy="1418726"/>
+          <a:xfrm flipV="1">
+            <a:off x="12826948" y="1994191"/>
+            <a:ext cx="3196978" cy="579630"/>
           </a:xfrm>
           <a:prstGeom prst="straightConnector1">
             <a:avLst/>
@@ -18126,14 +18127,14 @@
           <p:cNvCxnSpPr>
             <a:cxnSpLocks/>
             <a:stCxn id="51" idx="6"/>
-            <a:endCxn id="273" idx="2"/>
+            <a:endCxn id="509" idx="2"/>
           </p:cNvCxnSpPr>
           <p:nvPr/>
         </p:nvCxnSpPr>
         <p:spPr>
-          <a:xfrm>
-            <a:off x="12826948" y="3722051"/>
-            <a:ext cx="4672312" cy="270496"/>
+          <a:xfrm flipV="1">
+            <a:off x="12826948" y="1994191"/>
+            <a:ext cx="3196978" cy="1727860"/>
           </a:xfrm>
           <a:prstGeom prst="straightConnector1">
             <a:avLst/>
@@ -18178,8 +18179,8 @@
         </p:nvCxnSpPr>
         <p:spPr>
           <a:xfrm flipV="1">
-            <a:off x="12984928" y="3992547"/>
-            <a:ext cx="4514332" cy="1526285"/>
+            <a:off x="13804232" y="3992547"/>
+            <a:ext cx="3695028" cy="3701682"/>
           </a:xfrm>
           <a:prstGeom prst="straightConnector1">
             <a:avLst/>
@@ -18224,8 +18225,8 @@
         </p:nvCxnSpPr>
         <p:spPr>
           <a:xfrm flipV="1">
-            <a:off x="12973748" y="3992547"/>
-            <a:ext cx="4525512" cy="2702920"/>
+            <a:off x="13793052" y="3992547"/>
+            <a:ext cx="3706208" cy="4878317"/>
           </a:xfrm>
           <a:prstGeom prst="straightConnector1">
             <a:avLst/>
@@ -18270,8 +18271,8 @@
         </p:nvCxnSpPr>
         <p:spPr>
           <a:xfrm flipV="1">
-            <a:off x="12887857" y="3992547"/>
-            <a:ext cx="4611403" cy="3653788"/>
+            <a:off x="13707161" y="3992547"/>
+            <a:ext cx="3792099" cy="5829185"/>
           </a:xfrm>
           <a:prstGeom prst="straightConnector1">
             <a:avLst/>
@@ -18352,7 +18353,7 @@
                   <a:schemeClr val="tx1"/>
                 </a:solidFill>
               </a:rPr>
-              <a:t>26</a:t>
+              <a:t>29</a:t>
             </a:r>
             <a:endParaRPr lang="en-KR" dirty="0">
               <a:solidFill>
@@ -18425,9 +18426,9 @@
           <p:nvPr/>
         </p:nvCxnSpPr>
         <p:spPr>
-          <a:xfrm>
-            <a:off x="13894321" y="9189274"/>
-            <a:ext cx="5427293" cy="2262513"/>
+          <a:xfrm flipV="1">
+            <a:off x="13894321" y="11451787"/>
+            <a:ext cx="5427293" cy="174009"/>
           </a:xfrm>
           <a:prstGeom prst="straightConnector1">
             <a:avLst/>
@@ -18465,14 +18466,15 @@
           </p:cNvPr>
           <p:cNvCxnSpPr>
             <a:cxnSpLocks/>
+            <a:stCxn id="85" idx="5"/>
             <a:endCxn id="305" idx="2"/>
           </p:cNvCxnSpPr>
           <p:nvPr/>
         </p:nvCxnSpPr>
         <p:spPr>
-          <a:xfrm>
-            <a:off x="13908137" y="10495356"/>
-            <a:ext cx="5413477" cy="956431"/>
+          <a:xfrm flipV="1">
+            <a:off x="13808430" y="11451787"/>
+            <a:ext cx="5513184" cy="1548790"/>
           </a:xfrm>
           <a:prstGeom prst="straightConnector1">
             <a:avLst/>
@@ -18518,7 +18520,7 @@
         <p:spPr>
           <a:xfrm flipV="1">
             <a:off x="13877366" y="11451787"/>
-            <a:ext cx="5444248" cy="32196"/>
+            <a:ext cx="5444248" cy="2468718"/>
           </a:xfrm>
           <a:prstGeom prst="straightConnector1">
             <a:avLst/>
@@ -18564,7 +18566,7 @@
         <p:spPr>
           <a:xfrm flipV="1">
             <a:off x="13847469" y="11451787"/>
-            <a:ext cx="5474145" cy="1174391"/>
+            <a:ext cx="5474145" cy="3610913"/>
           </a:xfrm>
           <a:prstGeom prst="straightConnector1">
             <a:avLst/>
@@ -18645,7 +18647,7 @@
                   <a:schemeClr val="tx1"/>
                 </a:solidFill>
               </a:rPr>
-              <a:t>31</a:t>
+              <a:t>34</a:t>
             </a:r>
             <a:endParaRPr lang="en-KR" dirty="0">
               <a:solidFill>
@@ -18718,9 +18720,9 @@
           <p:nvPr/>
         </p:nvCxnSpPr>
         <p:spPr>
-          <a:xfrm>
-            <a:off x="14297510" y="14609769"/>
-            <a:ext cx="6417475" cy="1293101"/>
+          <a:xfrm flipV="1">
+            <a:off x="14297510" y="15902870"/>
+            <a:ext cx="6417475" cy="1265702"/>
           </a:xfrm>
           <a:prstGeom prst="straightConnector1">
             <a:avLst/>
@@ -18766,7 +18768,7 @@
         <p:spPr>
           <a:xfrm flipV="1">
             <a:off x="14297510" y="15902870"/>
-            <a:ext cx="6417475" cy="1407866"/>
+            <a:ext cx="6417475" cy="3966669"/>
           </a:xfrm>
           <a:prstGeom prst="straightConnector1">
             <a:avLst/>
@@ -18847,7 +18849,7 @@
                   <a:schemeClr val="tx1"/>
                 </a:solidFill>
               </a:rPr>
-              <a:t>38</a:t>
+              <a:t>41</a:t>
             </a:r>
             <a:endParaRPr lang="en-KR" dirty="0">
               <a:solidFill>
@@ -18921,8 +18923,8 @@
         </p:nvCxnSpPr>
         <p:spPr>
           <a:xfrm flipV="1">
-            <a:off x="16327721" y="21213424"/>
-            <a:ext cx="5125818" cy="825762"/>
+            <a:off x="16327722" y="21213424"/>
+            <a:ext cx="5125817" cy="3225460"/>
           </a:xfrm>
           <a:prstGeom prst="straightConnector1">
             <a:avLst/>
@@ -19003,7 +19005,7 @@
                   <a:schemeClr val="tx1"/>
                 </a:solidFill>
               </a:rPr>
-              <a:t>45</a:t>
+              <a:t>48</a:t>
             </a:r>
             <a:endParaRPr lang="en-KR" dirty="0">
               <a:solidFill>
@@ -19077,8 +19079,8 @@
         </p:nvCxnSpPr>
         <p:spPr>
           <a:xfrm flipV="1">
-            <a:off x="14774072" y="26286366"/>
-            <a:ext cx="7913316" cy="132962"/>
+            <a:off x="14774073" y="26286366"/>
+            <a:ext cx="7913315" cy="2670718"/>
           </a:xfrm>
           <a:prstGeom prst="straightConnector1">
             <a:avLst/>
@@ -19159,7 +19161,7 @@
                   <a:schemeClr val="tx1"/>
                 </a:solidFill>
               </a:rPr>
-              <a:t>51</a:t>
+              <a:t>54</a:t>
             </a:r>
             <a:endParaRPr lang="en-KR" dirty="0">
               <a:solidFill>
@@ -19232,9 +19234,9 @@
           <p:nvPr/>
         </p:nvCxnSpPr>
         <p:spPr>
-          <a:xfrm>
-            <a:off x="15024013" y="30315865"/>
-            <a:ext cx="8547295" cy="154094"/>
+          <a:xfrm flipV="1">
+            <a:off x="15024013" y="30469959"/>
+            <a:ext cx="8547295" cy="2241653"/>
           </a:xfrm>
           <a:prstGeom prst="straightConnector1">
             <a:avLst/>
@@ -19275,7 +19277,7 @@
         </p:nvSpPr>
         <p:spPr>
           <a:xfrm>
-            <a:off x="12105178" y="33310920"/>
+            <a:off x="12105178" y="35026431"/>
             <a:ext cx="586500" cy="558224"/>
           </a:xfrm>
           <a:prstGeom prst="ellipse">
@@ -19315,7 +19317,7 @@
                   <a:schemeClr val="tx1"/>
                 </a:solidFill>
               </a:rPr>
-              <a:t>53</a:t>
+              <a:t>56</a:t>
             </a:r>
           </a:p>
         </p:txBody>
@@ -19336,7 +19338,7 @@
         </p:nvSpPr>
         <p:spPr>
           <a:xfrm>
-            <a:off x="11793942" y="33258607"/>
+            <a:off x="11793942" y="34974118"/>
             <a:ext cx="498943" cy="629242"/>
           </a:xfrm>
           <a:prstGeom prst="rect">
@@ -19536,7 +19538,7 @@
         </p:nvSpPr>
         <p:spPr>
           <a:xfrm>
-            <a:off x="11202984" y="33310920"/>
+            <a:off x="11202984" y="35026431"/>
             <a:ext cx="586500" cy="558224"/>
           </a:xfrm>
           <a:prstGeom prst="ellipse">
@@ -19576,7 +19578,7 @@
                   <a:schemeClr val="tx1"/>
                 </a:solidFill>
               </a:rPr>
-              <a:t>52</a:t>
+              <a:t>55</a:t>
             </a:r>
           </a:p>
         </p:txBody>
@@ -19599,7 +19601,7 @@
         </p:nvCxnSpPr>
         <p:spPr>
           <a:xfrm>
-            <a:off x="11789484" y="33590032"/>
+            <a:off x="11789484" y="35305543"/>
             <a:ext cx="315694" cy="0"/>
           </a:xfrm>
           <a:prstGeom prst="straightConnector1">
@@ -19710,7 +19712,7 @@
         <p:spPr>
           <a:xfrm>
             <a:off x="1843464" y="32876915"/>
-            <a:ext cx="9359520" cy="713117"/>
+            <a:ext cx="9359520" cy="2428628"/>
           </a:xfrm>
           <a:prstGeom prst="straightConnector1">
             <a:avLst/>
@@ -19837,7 +19839,7 @@
                   <a:schemeClr val="tx1"/>
                 </a:solidFill>
               </a:rPr>
-              <a:t>54</a:t>
+              <a:t>57</a:t>
             </a:r>
             <a:endParaRPr lang="en-KR" dirty="0">
               <a:solidFill>
@@ -19866,7 +19868,7 @@
         <p:spPr>
           <a:xfrm flipV="1">
             <a:off x="12691678" y="32917497"/>
-            <a:ext cx="11840922" cy="672535"/>
+            <a:ext cx="11840922" cy="2388046"/>
           </a:xfrm>
           <a:prstGeom prst="straightConnector1">
             <a:avLst/>
@@ -19907,7 +19909,7 @@
         </p:nvSpPr>
         <p:spPr>
           <a:xfrm>
-            <a:off x="12167939" y="33382455"/>
+            <a:off x="12167939" y="35097966"/>
             <a:ext cx="436182" cy="415153"/>
           </a:xfrm>
           <a:prstGeom prst="ellipse">
@@ -20009,7 +20011,7 @@
         </p:nvSpPr>
         <p:spPr>
           <a:xfrm>
-            <a:off x="12713034" y="30111280"/>
+            <a:off x="12713034" y="32507027"/>
             <a:ext cx="436182" cy="415153"/>
           </a:xfrm>
           <a:prstGeom prst="ellipse">
@@ -20068,15 +20070,12 @@
           <p:nvPr/>
         </p:nvCxnSpPr>
         <p:spPr>
-          <a:xfrm rot="16200000" flipH="1">
-            <a:off x="15826954" y="7957127"/>
-            <a:ext cx="165166" cy="6824154"/>
-          </a:xfrm>
-          <a:prstGeom prst="curvedConnector4">
-            <a:avLst>
-              <a:gd name="adj1" fmla="val -246430"/>
-              <a:gd name="adj2" fmla="val 49321"/>
-            </a:avLst>
+          <a:xfrm rot="5400000" flipH="1" flipV="1">
+            <a:off x="14773859" y="9175388"/>
+            <a:ext cx="2271356" cy="6824154"/>
+          </a:xfrm>
+          <a:prstGeom prst="curvedConnector2">
+            <a:avLst/>
           </a:prstGeom>
           <a:ln w="25400">
             <a:solidFill>
@@ -20118,12 +20117,12 @@
         </p:nvCxnSpPr>
         <p:spPr>
           <a:xfrm rot="5400000" flipH="1" flipV="1">
-            <a:off x="15220643" y="8728604"/>
-            <a:ext cx="1377788" cy="6824154"/>
+            <a:off x="14002382" y="9946865"/>
+            <a:ext cx="3814310" cy="6824154"/>
           </a:xfrm>
           <a:prstGeom prst="curvedConnector4">
             <a:avLst>
-              <a:gd name="adj1" fmla="val -16592"/>
+              <a:gd name="adj1" fmla="val -5993"/>
               <a:gd name="adj2" fmla="val 50629"/>
             </a:avLst>
           </a:prstGeom>
@@ -20168,7 +20167,7 @@
         <p:spPr>
           <a:xfrm flipV="1">
             <a:off x="12381088" y="15902870"/>
-            <a:ext cx="8333897" cy="387041"/>
+            <a:ext cx="8333897" cy="2945844"/>
           </a:xfrm>
           <a:prstGeom prst="straightConnector1">
             <a:avLst/>
@@ -20212,15 +20211,12 @@
           <p:nvPr/>
         </p:nvCxnSpPr>
         <p:spPr>
-          <a:xfrm rot="16200000" flipH="1">
-            <a:off x="18182440" y="25081091"/>
-            <a:ext cx="351456" cy="10426280"/>
-          </a:xfrm>
-          <a:prstGeom prst="curvedConnector4">
-            <a:avLst>
-              <a:gd name="adj1" fmla="val -65044"/>
-              <a:gd name="adj2" fmla="val 50412"/>
-            </a:avLst>
+          <a:xfrm rot="5400000" flipH="1" flipV="1">
+            <a:off x="17336023" y="26278965"/>
+            <a:ext cx="2044291" cy="10426280"/>
+          </a:xfrm>
+          <a:prstGeom prst="curvedConnector2">
+            <a:avLst/>
           </a:prstGeom>
           <a:ln w="25400">
             <a:solidFill>
@@ -20261,9 +20257,9 @@
           <p:nvPr/>
         </p:nvCxnSpPr>
         <p:spPr>
-          <a:xfrm>
-            <a:off x="13151155" y="28892729"/>
-            <a:ext cx="10420153" cy="1577230"/>
+          <a:xfrm flipV="1">
+            <a:off x="13151155" y="30469959"/>
+            <a:ext cx="10420153" cy="818517"/>
           </a:xfrm>
           <a:prstGeom prst="straightConnector1">
             <a:avLst/>
@@ -20308,7 +20304,7 @@
         </p:nvCxnSpPr>
         <p:spPr>
           <a:xfrm>
-            <a:off x="10902535" y="6092036"/>
+            <a:off x="11721839" y="8267433"/>
             <a:ext cx="1570604" cy="1554299"/>
           </a:xfrm>
           <a:prstGeom prst="straightConnector1">
@@ -20352,7 +20348,7 @@
         </p:nvSpPr>
         <p:spPr>
           <a:xfrm>
-            <a:off x="11621704" y="6678306"/>
+            <a:off x="12441008" y="8853703"/>
             <a:ext cx="1067551" cy="558224"/>
           </a:xfrm>
           <a:prstGeom prst="rect">
@@ -20559,7 +20555,7 @@
         </p:nvCxnSpPr>
         <p:spPr>
           <a:xfrm rot="16200000" flipH="1">
-            <a:off x="13941079" y="19955792"/>
+            <a:off x="13941080" y="22355490"/>
             <a:ext cx="1768254" cy="2003811"/>
           </a:xfrm>
           <a:prstGeom prst="curvedConnector3">
@@ -20607,7 +20603,7 @@
         </p:nvCxnSpPr>
         <p:spPr>
           <a:xfrm rot="5400000" flipH="1" flipV="1">
-            <a:off x="14198238" y="22150719"/>
+            <a:off x="14198239" y="24550417"/>
             <a:ext cx="1668654" cy="2003811"/>
           </a:xfrm>
           <a:prstGeom prst="curvedConnector3">
@@ -20653,7 +20649,7 @@
         </p:nvSpPr>
         <p:spPr>
           <a:xfrm>
-            <a:off x="14079102" y="19857133"/>
+            <a:off x="14079103" y="22256831"/>
             <a:ext cx="457200" cy="558224"/>
           </a:xfrm>
           <a:prstGeom prst="rect">
@@ -20855,7 +20851,7 @@
         </p:nvSpPr>
         <p:spPr>
           <a:xfrm>
-            <a:off x="15413632" y="23848365"/>
+            <a:off x="15413633" y="26248063"/>
             <a:ext cx="457200" cy="558224"/>
           </a:xfrm>
           <a:prstGeom prst="rect">
@@ -21041,6 +21037,336 @@
           </a:p>
         </p:txBody>
       </p:sp>
+      <p:sp>
+        <p:nvSpPr>
+          <p:cNvPr id="466" name="Oval 465">
+            <a:extLst>
+              <a:ext uri="{FF2B5EF4-FFF2-40B4-BE49-F238E27FC236}">
+                <a16:creationId xmlns:a16="http://schemas.microsoft.com/office/drawing/2014/main" id="{CFD7E45B-104D-386C-A87A-27297EC9753C}"/>
+              </a:ext>
+            </a:extLst>
+          </p:cNvPr>
+          <p:cNvSpPr/>
+          <p:nvPr/>
+        </p:nvSpPr>
+        <p:spPr>
+          <a:xfrm>
+            <a:off x="10554705" y="2496743"/>
+            <a:ext cx="586500" cy="558224"/>
+          </a:xfrm>
+          <a:prstGeom prst="ellipse">
+            <a:avLst/>
+          </a:prstGeom>
+          <a:noFill/>
+          <a:ln w="38100">
+            <a:solidFill>
+              <a:schemeClr val="tx1"/>
+            </a:solidFill>
+          </a:ln>
+        </p:spPr>
+        <p:style>
+          <a:lnRef idx="2">
+            <a:schemeClr val="accent1">
+              <a:shade val="15000"/>
+            </a:schemeClr>
+          </a:lnRef>
+          <a:fillRef idx="1">
+            <a:schemeClr val="accent1"/>
+          </a:fillRef>
+          <a:effectRef idx="0">
+            <a:schemeClr val="accent1"/>
+          </a:effectRef>
+          <a:fontRef idx="minor">
+            <a:schemeClr val="lt1"/>
+          </a:fontRef>
+        </p:style>
+        <p:txBody>
+          <a:bodyPr rtlCol="0" anchor="ctr"/>
+          <a:lstStyle/>
+          <a:p>
+            <a:pPr algn="ctr"/>
+            <a:r>
+              <a:rPr lang="en-US" altLang="ko-KR" dirty="0">
+                <a:solidFill>
+                  <a:schemeClr val="tx1"/>
+                </a:solidFill>
+              </a:rPr>
+              <a:t>9</a:t>
+            </a:r>
+            <a:endParaRPr lang="en-KR" dirty="0">
+              <a:solidFill>
+                <a:schemeClr val="tx1"/>
+              </a:solidFill>
+            </a:endParaRPr>
+          </a:p>
+        </p:txBody>
+      </p:sp>
+      <p:sp>
+        <p:nvSpPr>
+          <p:cNvPr id="467" name="Oval 466">
+            <a:extLst>
+              <a:ext uri="{FF2B5EF4-FFF2-40B4-BE49-F238E27FC236}">
+                <a16:creationId xmlns:a16="http://schemas.microsoft.com/office/drawing/2014/main" id="{08FBD628-2238-40F6-C92B-09CE7913BB31}"/>
+              </a:ext>
+            </a:extLst>
+          </p:cNvPr>
+          <p:cNvSpPr/>
+          <p:nvPr/>
+        </p:nvSpPr>
+        <p:spPr>
+          <a:xfrm>
+            <a:off x="9714047" y="1715079"/>
+            <a:ext cx="586500" cy="558224"/>
+          </a:xfrm>
+          <a:prstGeom prst="ellipse">
+            <a:avLst/>
+          </a:prstGeom>
+          <a:noFill/>
+          <a:ln w="38100">
+            <a:solidFill>
+              <a:schemeClr val="tx1"/>
+            </a:solidFill>
+          </a:ln>
+        </p:spPr>
+        <p:style>
+          <a:lnRef idx="2">
+            <a:schemeClr val="accent1">
+              <a:shade val="15000"/>
+            </a:schemeClr>
+          </a:lnRef>
+          <a:fillRef idx="1">
+            <a:schemeClr val="accent1"/>
+          </a:fillRef>
+          <a:effectRef idx="0">
+            <a:schemeClr val="accent1"/>
+          </a:effectRef>
+          <a:fontRef idx="minor">
+            <a:schemeClr val="lt1"/>
+          </a:fontRef>
+        </p:style>
+        <p:txBody>
+          <a:bodyPr rtlCol="0" anchor="ctr"/>
+          <a:lstStyle/>
+          <a:p>
+            <a:pPr algn="ctr"/>
+            <a:r>
+              <a:rPr lang="en-US" altLang="ko-KR" dirty="0">
+                <a:solidFill>
+                  <a:schemeClr val="tx1"/>
+                </a:solidFill>
+              </a:rPr>
+              <a:t>7</a:t>
+            </a:r>
+            <a:endParaRPr lang="en-KR" dirty="0">
+              <a:solidFill>
+                <a:schemeClr val="tx1"/>
+              </a:solidFill>
+            </a:endParaRPr>
+          </a:p>
+        </p:txBody>
+      </p:sp>
+      <p:cxnSp>
+        <p:nvCxnSpPr>
+          <p:cNvPr id="470" name="Straight Arrow Connector 469">
+            <a:extLst>
+              <a:ext uri="{FF2B5EF4-FFF2-40B4-BE49-F238E27FC236}">
+                <a16:creationId xmlns:a16="http://schemas.microsoft.com/office/drawing/2014/main" id="{4C66B72F-B461-9A29-F600-3ABFB1D10221}"/>
+              </a:ext>
+            </a:extLst>
+          </p:cNvPr>
+          <p:cNvCxnSpPr>
+            <a:cxnSpLocks/>
+            <a:stCxn id="467" idx="7"/>
+            <a:endCxn id="46" idx="3"/>
+          </p:cNvCxnSpPr>
+          <p:nvPr/>
+        </p:nvCxnSpPr>
+        <p:spPr>
+          <a:xfrm flipV="1">
+            <a:off x="10214656" y="1321398"/>
+            <a:ext cx="425940" cy="475431"/>
+          </a:xfrm>
+          <a:prstGeom prst="straightConnector1">
+            <a:avLst/>
+          </a:prstGeom>
+          <a:ln w="25400">
+            <a:solidFill>
+              <a:schemeClr val="tx1"/>
+            </a:solidFill>
+            <a:tailEnd type="triangle"/>
+          </a:ln>
+        </p:spPr>
+        <p:style>
+          <a:lnRef idx="1">
+            <a:schemeClr val="accent1"/>
+          </a:lnRef>
+          <a:fillRef idx="0">
+            <a:schemeClr val="accent1"/>
+          </a:fillRef>
+          <a:effectRef idx="0">
+            <a:schemeClr val="accent1"/>
+          </a:effectRef>
+          <a:fontRef idx="minor">
+            <a:schemeClr val="tx1"/>
+          </a:fontRef>
+        </p:style>
+      </p:cxnSp>
+      <p:cxnSp>
+        <p:nvCxnSpPr>
+          <p:cNvPr id="474" name="Straight Arrow Connector 473">
+            <a:extLst>
+              <a:ext uri="{FF2B5EF4-FFF2-40B4-BE49-F238E27FC236}">
+                <a16:creationId xmlns:a16="http://schemas.microsoft.com/office/drawing/2014/main" id="{D1EBC41F-83CB-DC41-DE57-9E3F3FC1FADF}"/>
+              </a:ext>
+            </a:extLst>
+          </p:cNvPr>
+          <p:cNvCxnSpPr>
+            <a:cxnSpLocks/>
+            <a:stCxn id="467" idx="5"/>
+            <a:endCxn id="466" idx="1"/>
+          </p:cNvCxnSpPr>
+          <p:nvPr/>
+        </p:nvCxnSpPr>
+        <p:spPr>
+          <a:xfrm>
+            <a:off x="10214656" y="2191553"/>
+            <a:ext cx="425940" cy="386940"/>
+          </a:xfrm>
+          <a:prstGeom prst="straightConnector1">
+            <a:avLst/>
+          </a:prstGeom>
+          <a:ln w="25400">
+            <a:solidFill>
+              <a:schemeClr val="tx1"/>
+            </a:solidFill>
+            <a:tailEnd type="triangle"/>
+          </a:ln>
+        </p:spPr>
+        <p:style>
+          <a:lnRef idx="1">
+            <a:schemeClr val="accent1"/>
+          </a:lnRef>
+          <a:fillRef idx="0">
+            <a:schemeClr val="accent1"/>
+          </a:fillRef>
+          <a:effectRef idx="0">
+            <a:schemeClr val="accent1"/>
+          </a:effectRef>
+          <a:fontRef idx="minor">
+            <a:schemeClr val="tx1"/>
+          </a:fontRef>
+        </p:style>
+      </p:cxnSp>
+      <p:sp>
+        <p:nvSpPr>
+          <p:cNvPr id="509" name="Oval 508">
+            <a:extLst>
+              <a:ext uri="{FF2B5EF4-FFF2-40B4-BE49-F238E27FC236}">
+                <a16:creationId xmlns:a16="http://schemas.microsoft.com/office/drawing/2014/main" id="{51D8FD2F-ED56-C635-FA89-0019A40EAEE2}"/>
+              </a:ext>
+            </a:extLst>
+          </p:cNvPr>
+          <p:cNvSpPr/>
+          <p:nvPr/>
+        </p:nvSpPr>
+        <p:spPr>
+          <a:xfrm>
+            <a:off x="16023926" y="1715079"/>
+            <a:ext cx="586500" cy="558224"/>
+          </a:xfrm>
+          <a:prstGeom prst="ellipse">
+            <a:avLst/>
+          </a:prstGeom>
+          <a:noFill/>
+          <a:ln w="38100">
+            <a:solidFill>
+              <a:schemeClr val="tx1"/>
+            </a:solidFill>
+          </a:ln>
+        </p:spPr>
+        <p:style>
+          <a:lnRef idx="2">
+            <a:schemeClr val="accent1">
+              <a:shade val="15000"/>
+            </a:schemeClr>
+          </a:lnRef>
+          <a:fillRef idx="1">
+            <a:schemeClr val="accent1"/>
+          </a:fillRef>
+          <a:effectRef idx="0">
+            <a:schemeClr val="accent1"/>
+          </a:effectRef>
+          <a:fontRef idx="minor">
+            <a:schemeClr val="lt1"/>
+          </a:fontRef>
+        </p:style>
+        <p:txBody>
+          <a:bodyPr rtlCol="0" anchor="ctr"/>
+          <a:lstStyle/>
+          <a:p>
+            <a:pPr algn="ctr"/>
+            <a:r>
+              <a:rPr lang="en-US" altLang="ko-KR" dirty="0">
+                <a:solidFill>
+                  <a:schemeClr val="tx1"/>
+                </a:solidFill>
+              </a:rPr>
+              <a:t>14</a:t>
+            </a:r>
+            <a:endParaRPr lang="en-KR" dirty="0">
+              <a:solidFill>
+                <a:schemeClr val="tx1"/>
+              </a:solidFill>
+            </a:endParaRPr>
+          </a:p>
+        </p:txBody>
+      </p:sp>
+      <p:cxnSp>
+        <p:nvCxnSpPr>
+          <p:cNvPr id="65" name="Straight Arrow Connector 64">
+            <a:extLst>
+              <a:ext uri="{FF2B5EF4-FFF2-40B4-BE49-F238E27FC236}">
+                <a16:creationId xmlns:a16="http://schemas.microsoft.com/office/drawing/2014/main" id="{6895469A-F25F-169D-2ED6-74473FED3EA1}"/>
+              </a:ext>
+            </a:extLst>
+          </p:cNvPr>
+          <p:cNvCxnSpPr>
+            <a:cxnSpLocks/>
+            <a:stCxn id="509" idx="5"/>
+            <a:endCxn id="273" idx="0"/>
+          </p:cNvCxnSpPr>
+          <p:nvPr/>
+        </p:nvCxnSpPr>
+        <p:spPr>
+          <a:xfrm>
+            <a:off x="16524535" y="2191553"/>
+            <a:ext cx="1267975" cy="1521882"/>
+          </a:xfrm>
+          <a:prstGeom prst="straightConnector1">
+            <a:avLst/>
+          </a:prstGeom>
+          <a:ln w="25400">
+            <a:solidFill>
+              <a:schemeClr val="tx1"/>
+            </a:solidFill>
+            <a:tailEnd type="triangle"/>
+          </a:ln>
+        </p:spPr>
+        <p:style>
+          <a:lnRef idx="1">
+            <a:schemeClr val="accent1"/>
+          </a:lnRef>
+          <a:fillRef idx="0">
+            <a:schemeClr val="accent1"/>
+          </a:fillRef>
+          <a:effectRef idx="0">
+            <a:schemeClr val="accent1"/>
+          </a:effectRef>
+          <a:fontRef idx="minor">
+            <a:schemeClr val="tx1"/>
+          </a:fontRef>
+        </p:style>
+      </p:cxnSp>
     </p:spTree>
     <p:extLst>
       <p:ext uri="{BB962C8B-B14F-4D97-AF65-F5344CB8AC3E}">

</xml_diff>